<commit_message>
Clean up figures for Sec 2.4, 2.5.
</commit_message>
<xml_diff>
--- a/monitoring_wcet/figs_src/diagrams.pptx
+++ b/monitoring_wcet/figs_src/diagrams.pptx
@@ -5,10 +5,13 @@
     <p:sldMasterId id="2147483648" r:id="rId1"/>
   </p:sldMasterIdLst>
   <p:notesMasterIdLst>
-    <p:notesMasterId r:id="rId3"/>
+    <p:notesMasterId r:id="rId6"/>
   </p:notesMasterIdLst>
   <p:sldIdLst>
     <p:sldId id="269" r:id="rId2"/>
+    <p:sldId id="270" r:id="rId3"/>
+    <p:sldId id="271" r:id="rId4"/>
+    <p:sldId id="272" r:id="rId5"/>
   </p:sldIdLst>
   <p:sldSz cx="3200400" cy="7772400"/>
   <p:notesSz cx="2743200" cy="7315200"/>
@@ -152,7 +155,7 @@
           </a:prstGeom>
         </p:spPr>
         <p:txBody>
-          <a:bodyPr vert="horz" lIns="54204" tIns="27101" rIns="54204" bIns="27101" rtlCol="0"/>
+          <a:bodyPr vert="horz" lIns="54195" tIns="27096" rIns="54195" bIns="27096" rtlCol="0"/>
           <a:lstStyle>
             <a:lvl1pPr algn="l">
               <a:defRPr sz="700"/>
@@ -183,7 +186,7 @@
           </a:prstGeom>
         </p:spPr>
         <p:txBody>
-          <a:bodyPr vert="horz" lIns="54204" tIns="27101" rIns="54204" bIns="27101" rtlCol="0"/>
+          <a:bodyPr vert="horz" lIns="54195" tIns="27096" rIns="54195" bIns="27096" rtlCol="0"/>
           <a:lstStyle>
             <a:lvl1pPr algn="r">
               <a:defRPr sz="700"/>
@@ -224,7 +227,7 @@
           </a:ln>
         </p:spPr>
         <p:txBody>
-          <a:bodyPr vert="horz" lIns="54204" tIns="27101" rIns="54204" bIns="27101" rtlCol="0" anchor="ctr"/>
+          <a:bodyPr vert="horz" lIns="54195" tIns="27096" rIns="54195" bIns="27096" rtlCol="0" anchor="ctr"/>
           <a:lstStyle/>
           <a:p>
             <a:endParaRPr lang="en-US"/>
@@ -251,7 +254,7 @@
           </a:prstGeom>
         </p:spPr>
         <p:txBody>
-          <a:bodyPr vert="horz" lIns="54204" tIns="27101" rIns="54204" bIns="27101" rtlCol="0"/>
+          <a:bodyPr vert="horz" lIns="54195" tIns="27096" rIns="54195" bIns="27096" rtlCol="0"/>
           <a:lstStyle/>
           <a:p>
             <a:pPr lvl="0"/>
@@ -311,7 +314,7 @@
           </a:prstGeom>
         </p:spPr>
         <p:txBody>
-          <a:bodyPr vert="horz" lIns="54204" tIns="27101" rIns="54204" bIns="27101" rtlCol="0" anchor="b"/>
+          <a:bodyPr vert="horz" lIns="54195" tIns="27096" rIns="54195" bIns="27096" rtlCol="0" anchor="b"/>
           <a:lstStyle>
             <a:lvl1pPr algn="l">
               <a:defRPr sz="700"/>
@@ -342,7 +345,7 @@
           </a:prstGeom>
         </p:spPr>
         <p:txBody>
-          <a:bodyPr vert="horz" lIns="54204" tIns="27101" rIns="54204" bIns="27101" rtlCol="0" anchor="b"/>
+          <a:bodyPr vert="horz" lIns="54195" tIns="27096" rIns="54195" bIns="27096" rtlCol="0" anchor="b"/>
           <a:lstStyle>
             <a:lvl1pPr algn="r">
               <a:defRPr sz="700"/>
@@ -3740,13 +3743,6 @@
               </a:rPr>
               <a:t>Monitoring Core</a:t>
             </a:r>
-            <a:endParaRPr lang="en-US" sz="800" dirty="0" smtClean="0">
-              <a:solidFill>
-                <a:schemeClr val="tx1"/>
-              </a:solidFill>
-              <a:latin typeface="Arial" pitchFamily="34" charset="0"/>
-              <a:cs typeface="Arial" pitchFamily="34" charset="0"/>
-            </a:endParaRPr>
           </a:p>
           <a:p>
             <a:pPr algn="ctr"/>
@@ -4088,6 +4084,2558 @@
     <p:extLst>
       <p:ext uri="{BB962C8B-B14F-4D97-AF65-F5344CB8AC3E}">
         <p14:creationId xmlns:p14="http://schemas.microsoft.com/office/powerpoint/2010/main" val="2005262311"/>
+      </p:ext>
+    </p:extLst>
+  </p:cSld>
+  <p:clrMapOvr>
+    <a:masterClrMapping/>
+  </p:clrMapOvr>
+</p:sld>
+</file>
+
+<file path=ppt/slides/slide2.xml><?xml version="1.0" encoding="utf-8"?>
+<p:sld xmlns:a="http://schemas.openxmlformats.org/drawingml/2006/main" xmlns:r="http://schemas.openxmlformats.org/officeDocument/2006/relationships" xmlns:p="http://schemas.openxmlformats.org/presentationml/2006/main">
+  <p:cSld>
+    <p:spTree>
+      <p:nvGrpSpPr>
+        <p:cNvPr id="1" name=""/>
+        <p:cNvGrpSpPr/>
+        <p:nvPr/>
+      </p:nvGrpSpPr>
+      <p:grpSpPr>
+        <a:xfrm>
+          <a:off x="0" y="0"/>
+          <a:ext cx="0" cy="0"/>
+          <a:chOff x="0" y="0"/>
+          <a:chExt cx="0" cy="0"/>
+        </a:xfrm>
+      </p:grpSpPr>
+      <p:sp>
+        <p:nvSpPr>
+          <p:cNvPr id="4" name="Rectangle 3"/>
+          <p:cNvSpPr/>
+          <p:nvPr/>
+        </p:nvSpPr>
+        <p:spPr>
+          <a:xfrm>
+            <a:off x="1141171" y="187755"/>
+            <a:ext cx="890025" cy="296675"/>
+          </a:xfrm>
+          <a:prstGeom prst="rect">
+            <a:avLst/>
+          </a:prstGeom>
+          <a:solidFill>
+            <a:srgbClr val="FFFFCC"/>
+          </a:solidFill>
+          <a:ln w="12700">
+            <a:solidFill>
+              <a:schemeClr val="tx1"/>
+            </a:solidFill>
+          </a:ln>
+        </p:spPr>
+        <p:style>
+          <a:lnRef idx="2">
+            <a:schemeClr val="accent1">
+              <a:shade val="50000"/>
+            </a:schemeClr>
+          </a:lnRef>
+          <a:fillRef idx="1">
+            <a:schemeClr val="accent1"/>
+          </a:fillRef>
+          <a:effectRef idx="0">
+            <a:schemeClr val="accent1"/>
+          </a:effectRef>
+          <a:fontRef idx="minor">
+            <a:schemeClr val="lt1"/>
+          </a:fontRef>
+        </p:style>
+        <p:txBody>
+          <a:bodyPr rtlCol="0" anchor="ctr"/>
+          <a:lstStyle/>
+          <a:p>
+            <a:pPr algn="ctr"/>
+            <a:r>
+              <a:rPr lang="en-US" sz="800" dirty="0" smtClean="0">
+                <a:solidFill>
+                  <a:schemeClr val="tx1"/>
+                </a:solidFill>
+                <a:latin typeface="Arial" pitchFamily="34" charset="0"/>
+                <a:cs typeface="Arial" pitchFamily="34" charset="0"/>
+              </a:rPr>
+              <a:t>0</a:t>
+            </a:r>
+          </a:p>
+          <a:p>
+            <a:pPr algn="ctr"/>
+            <a:r>
+              <a:rPr lang="en-US" sz="800" dirty="0" smtClean="0">
+                <a:solidFill>
+                  <a:schemeClr val="tx1"/>
+                </a:solidFill>
+                <a:latin typeface="Arial" pitchFamily="34" charset="0"/>
+                <a:cs typeface="Arial" pitchFamily="34" charset="0"/>
+              </a:rPr>
+              <a:t>c0_max = 5</a:t>
+            </a:r>
+            <a:endParaRPr lang="en-US" sz="800" dirty="0">
+              <a:solidFill>
+                <a:schemeClr val="tx1"/>
+              </a:solidFill>
+              <a:latin typeface="Arial" pitchFamily="34" charset="0"/>
+              <a:cs typeface="Arial" pitchFamily="34" charset="0"/>
+            </a:endParaRPr>
+          </a:p>
+        </p:txBody>
+      </p:sp>
+      <p:sp>
+        <p:nvSpPr>
+          <p:cNvPr id="5" name="Rectangle 4"/>
+          <p:cNvSpPr/>
+          <p:nvPr/>
+        </p:nvSpPr>
+        <p:spPr>
+          <a:xfrm>
+            <a:off x="563265" y="824365"/>
+            <a:ext cx="890025" cy="296675"/>
+          </a:xfrm>
+          <a:prstGeom prst="rect">
+            <a:avLst/>
+          </a:prstGeom>
+          <a:solidFill>
+            <a:srgbClr val="FFFFCC"/>
+          </a:solidFill>
+          <a:ln w="12700">
+            <a:solidFill>
+              <a:schemeClr val="tx1"/>
+            </a:solidFill>
+          </a:ln>
+        </p:spPr>
+        <p:style>
+          <a:lnRef idx="2">
+            <a:schemeClr val="accent1">
+              <a:shade val="50000"/>
+            </a:schemeClr>
+          </a:lnRef>
+          <a:fillRef idx="1">
+            <a:schemeClr val="accent1"/>
+          </a:fillRef>
+          <a:effectRef idx="0">
+            <a:schemeClr val="accent1"/>
+          </a:effectRef>
+          <a:fontRef idx="minor">
+            <a:schemeClr val="lt1"/>
+          </a:fontRef>
+        </p:style>
+        <p:txBody>
+          <a:bodyPr rtlCol="0" anchor="ctr"/>
+          <a:lstStyle/>
+          <a:p>
+            <a:pPr algn="ctr"/>
+            <a:r>
+              <a:rPr lang="en-US" sz="800" dirty="0" smtClean="0">
+                <a:solidFill>
+                  <a:schemeClr val="tx1"/>
+                </a:solidFill>
+                <a:latin typeface="Arial" pitchFamily="34" charset="0"/>
+                <a:cs typeface="Arial" pitchFamily="34" charset="0"/>
+              </a:rPr>
+              <a:t>1</a:t>
+            </a:r>
+          </a:p>
+          <a:p>
+            <a:pPr algn="ctr"/>
+            <a:r>
+              <a:rPr lang="en-US" sz="800" dirty="0" smtClean="0">
+                <a:solidFill>
+                  <a:schemeClr val="tx1"/>
+                </a:solidFill>
+                <a:latin typeface="Arial" pitchFamily="34" charset="0"/>
+                <a:cs typeface="Arial" pitchFamily="34" charset="0"/>
+              </a:rPr>
+              <a:t>c1_max = 4</a:t>
+            </a:r>
+            <a:endParaRPr lang="en-US" sz="800" dirty="0">
+              <a:solidFill>
+                <a:schemeClr val="tx1"/>
+              </a:solidFill>
+              <a:latin typeface="Arial" pitchFamily="34" charset="0"/>
+              <a:cs typeface="Arial" pitchFamily="34" charset="0"/>
+            </a:endParaRPr>
+          </a:p>
+        </p:txBody>
+      </p:sp>
+      <p:sp>
+        <p:nvSpPr>
+          <p:cNvPr id="6" name="Rectangle 5"/>
+          <p:cNvSpPr/>
+          <p:nvPr/>
+        </p:nvSpPr>
+        <p:spPr>
+          <a:xfrm>
+            <a:off x="1751837" y="824365"/>
+            <a:ext cx="890025" cy="296675"/>
+          </a:xfrm>
+          <a:prstGeom prst="rect">
+            <a:avLst/>
+          </a:prstGeom>
+          <a:solidFill>
+            <a:srgbClr val="FFFFCC"/>
+          </a:solidFill>
+          <a:ln w="12700">
+            <a:solidFill>
+              <a:schemeClr val="tx1"/>
+            </a:solidFill>
+          </a:ln>
+        </p:spPr>
+        <p:style>
+          <a:lnRef idx="2">
+            <a:schemeClr val="accent1">
+              <a:shade val="50000"/>
+            </a:schemeClr>
+          </a:lnRef>
+          <a:fillRef idx="1">
+            <a:schemeClr val="accent1"/>
+          </a:fillRef>
+          <a:effectRef idx="0">
+            <a:schemeClr val="accent1"/>
+          </a:effectRef>
+          <a:fontRef idx="minor">
+            <a:schemeClr val="lt1"/>
+          </a:fontRef>
+        </p:style>
+        <p:txBody>
+          <a:bodyPr rtlCol="0" anchor="ctr"/>
+          <a:lstStyle/>
+          <a:p>
+            <a:pPr algn="ctr"/>
+            <a:r>
+              <a:rPr lang="en-US" sz="800" dirty="0" smtClean="0">
+                <a:solidFill>
+                  <a:schemeClr val="tx1"/>
+                </a:solidFill>
+                <a:latin typeface="Arial" pitchFamily="34" charset="0"/>
+                <a:cs typeface="Arial" pitchFamily="34" charset="0"/>
+              </a:rPr>
+              <a:t>2</a:t>
+            </a:r>
+          </a:p>
+          <a:p>
+            <a:pPr algn="ctr"/>
+            <a:r>
+              <a:rPr lang="en-US" sz="800" dirty="0" smtClean="0">
+                <a:solidFill>
+                  <a:schemeClr val="tx1"/>
+                </a:solidFill>
+                <a:latin typeface="Arial" pitchFamily="34" charset="0"/>
+                <a:cs typeface="Arial" pitchFamily="34" charset="0"/>
+              </a:rPr>
+              <a:t>c2_max = 7</a:t>
+            </a:r>
+            <a:endParaRPr lang="en-US" sz="800" dirty="0">
+              <a:solidFill>
+                <a:schemeClr val="tx1"/>
+              </a:solidFill>
+              <a:latin typeface="Arial" pitchFamily="34" charset="0"/>
+              <a:cs typeface="Arial" pitchFamily="34" charset="0"/>
+            </a:endParaRPr>
+          </a:p>
+        </p:txBody>
+      </p:sp>
+      <p:sp>
+        <p:nvSpPr>
+          <p:cNvPr id="7" name="Rectangle 6"/>
+          <p:cNvSpPr/>
+          <p:nvPr/>
+        </p:nvSpPr>
+        <p:spPr>
+          <a:xfrm>
+            <a:off x="1141170" y="1428280"/>
+            <a:ext cx="890026" cy="296675"/>
+          </a:xfrm>
+          <a:prstGeom prst="rect">
+            <a:avLst/>
+          </a:prstGeom>
+          <a:solidFill>
+            <a:srgbClr val="FFFFCC"/>
+          </a:solidFill>
+          <a:ln w="12700">
+            <a:solidFill>
+              <a:schemeClr val="tx1"/>
+            </a:solidFill>
+          </a:ln>
+        </p:spPr>
+        <p:style>
+          <a:lnRef idx="2">
+            <a:schemeClr val="accent1">
+              <a:shade val="50000"/>
+            </a:schemeClr>
+          </a:lnRef>
+          <a:fillRef idx="1">
+            <a:schemeClr val="accent1"/>
+          </a:fillRef>
+          <a:effectRef idx="0">
+            <a:schemeClr val="accent1"/>
+          </a:effectRef>
+          <a:fontRef idx="minor">
+            <a:schemeClr val="lt1"/>
+          </a:fontRef>
+        </p:style>
+        <p:txBody>
+          <a:bodyPr rtlCol="0" anchor="ctr"/>
+          <a:lstStyle/>
+          <a:p>
+            <a:pPr algn="ctr"/>
+            <a:r>
+              <a:rPr lang="en-US" sz="800" dirty="0" smtClean="0">
+                <a:solidFill>
+                  <a:schemeClr val="tx1"/>
+                </a:solidFill>
+                <a:latin typeface="Arial" pitchFamily="34" charset="0"/>
+                <a:cs typeface="Arial" pitchFamily="34" charset="0"/>
+              </a:rPr>
+              <a:t>3</a:t>
+            </a:r>
+          </a:p>
+          <a:p>
+            <a:pPr algn="ctr"/>
+            <a:r>
+              <a:rPr lang="en-US" sz="800" dirty="0" smtClean="0">
+                <a:solidFill>
+                  <a:schemeClr val="tx1"/>
+                </a:solidFill>
+                <a:latin typeface="Arial" pitchFamily="34" charset="0"/>
+                <a:cs typeface="Arial" pitchFamily="34" charset="0"/>
+              </a:rPr>
+              <a:t>c3_max = 10</a:t>
+            </a:r>
+            <a:endParaRPr lang="en-US" sz="800" dirty="0">
+              <a:solidFill>
+                <a:schemeClr val="tx1"/>
+              </a:solidFill>
+              <a:latin typeface="Arial" pitchFamily="34" charset="0"/>
+              <a:cs typeface="Arial" pitchFamily="34" charset="0"/>
+            </a:endParaRPr>
+          </a:p>
+        </p:txBody>
+      </p:sp>
+      <p:cxnSp>
+        <p:nvCxnSpPr>
+          <p:cNvPr id="8" name="Straight Arrow Connector 7"/>
+          <p:cNvCxnSpPr>
+            <a:stCxn id="4" idx="2"/>
+            <a:endCxn id="5" idx="0"/>
+          </p:cNvCxnSpPr>
+          <p:nvPr/>
+        </p:nvCxnSpPr>
+        <p:spPr>
+          <a:xfrm flipH="1">
+            <a:off x="1008278" y="484430"/>
+            <a:ext cx="577906" cy="339935"/>
+          </a:xfrm>
+          <a:prstGeom prst="straightConnector1">
+            <a:avLst/>
+          </a:prstGeom>
+          <a:ln w="12700">
+            <a:solidFill>
+              <a:schemeClr val="tx1"/>
+            </a:solidFill>
+            <a:tailEnd type="triangle"/>
+          </a:ln>
+        </p:spPr>
+        <p:style>
+          <a:lnRef idx="1">
+            <a:schemeClr val="accent1"/>
+          </a:lnRef>
+          <a:fillRef idx="0">
+            <a:schemeClr val="accent1"/>
+          </a:fillRef>
+          <a:effectRef idx="0">
+            <a:schemeClr val="accent1"/>
+          </a:effectRef>
+          <a:fontRef idx="minor">
+            <a:schemeClr val="tx1"/>
+          </a:fontRef>
+        </p:style>
+      </p:cxnSp>
+      <p:cxnSp>
+        <p:nvCxnSpPr>
+          <p:cNvPr id="9" name="Straight Arrow Connector 8"/>
+          <p:cNvCxnSpPr>
+            <a:stCxn id="4" idx="2"/>
+            <a:endCxn id="6" idx="0"/>
+          </p:cNvCxnSpPr>
+          <p:nvPr/>
+        </p:nvCxnSpPr>
+        <p:spPr>
+          <a:xfrm>
+            <a:off x="1586184" y="484430"/>
+            <a:ext cx="610666" cy="339935"/>
+          </a:xfrm>
+          <a:prstGeom prst="straightConnector1">
+            <a:avLst/>
+          </a:prstGeom>
+          <a:ln w="12700">
+            <a:solidFill>
+              <a:schemeClr val="tx1"/>
+            </a:solidFill>
+            <a:tailEnd type="triangle"/>
+          </a:ln>
+        </p:spPr>
+        <p:style>
+          <a:lnRef idx="1">
+            <a:schemeClr val="accent1"/>
+          </a:lnRef>
+          <a:fillRef idx="0">
+            <a:schemeClr val="accent1"/>
+          </a:fillRef>
+          <a:effectRef idx="0">
+            <a:schemeClr val="accent1"/>
+          </a:effectRef>
+          <a:fontRef idx="minor">
+            <a:schemeClr val="tx1"/>
+          </a:fontRef>
+        </p:style>
+      </p:cxnSp>
+      <p:cxnSp>
+        <p:nvCxnSpPr>
+          <p:cNvPr id="10" name="Straight Arrow Connector 9"/>
+          <p:cNvCxnSpPr>
+            <a:stCxn id="5" idx="2"/>
+            <a:endCxn id="7" idx="0"/>
+          </p:cNvCxnSpPr>
+          <p:nvPr/>
+        </p:nvCxnSpPr>
+        <p:spPr>
+          <a:xfrm>
+            <a:off x="1008278" y="1121040"/>
+            <a:ext cx="577905" cy="307240"/>
+          </a:xfrm>
+          <a:prstGeom prst="straightConnector1">
+            <a:avLst/>
+          </a:prstGeom>
+          <a:ln w="12700">
+            <a:solidFill>
+              <a:schemeClr val="tx1"/>
+            </a:solidFill>
+            <a:tailEnd type="triangle"/>
+          </a:ln>
+        </p:spPr>
+        <p:style>
+          <a:lnRef idx="1">
+            <a:schemeClr val="accent1"/>
+          </a:lnRef>
+          <a:fillRef idx="0">
+            <a:schemeClr val="accent1"/>
+          </a:fillRef>
+          <a:effectRef idx="0">
+            <a:schemeClr val="accent1"/>
+          </a:effectRef>
+          <a:fontRef idx="minor">
+            <a:schemeClr val="tx1"/>
+          </a:fontRef>
+        </p:style>
+      </p:cxnSp>
+      <p:cxnSp>
+        <p:nvCxnSpPr>
+          <p:cNvPr id="11" name="Straight Arrow Connector 10"/>
+          <p:cNvCxnSpPr>
+            <a:stCxn id="6" idx="2"/>
+            <a:endCxn id="7" idx="0"/>
+          </p:cNvCxnSpPr>
+          <p:nvPr/>
+        </p:nvCxnSpPr>
+        <p:spPr>
+          <a:xfrm flipH="1">
+            <a:off x="1586183" y="1121040"/>
+            <a:ext cx="610667" cy="307240"/>
+          </a:xfrm>
+          <a:prstGeom prst="straightConnector1">
+            <a:avLst/>
+          </a:prstGeom>
+          <a:ln w="12700">
+            <a:solidFill>
+              <a:schemeClr val="tx1"/>
+            </a:solidFill>
+            <a:tailEnd type="triangle"/>
+          </a:ln>
+        </p:spPr>
+        <p:style>
+          <a:lnRef idx="1">
+            <a:schemeClr val="accent1"/>
+          </a:lnRef>
+          <a:fillRef idx="0">
+            <a:schemeClr val="accent1"/>
+          </a:fillRef>
+          <a:effectRef idx="0">
+            <a:schemeClr val="accent1"/>
+          </a:effectRef>
+          <a:fontRef idx="minor">
+            <a:schemeClr val="tx1"/>
+          </a:fontRef>
+        </p:style>
+      </p:cxnSp>
+      <p:cxnSp>
+        <p:nvCxnSpPr>
+          <p:cNvPr id="12" name="Straight Arrow Connector 11"/>
+          <p:cNvCxnSpPr>
+            <a:stCxn id="7" idx="2"/>
+          </p:cNvCxnSpPr>
+          <p:nvPr/>
+        </p:nvCxnSpPr>
+        <p:spPr>
+          <a:xfrm>
+            <a:off x="1586183" y="1724955"/>
+            <a:ext cx="1" cy="202590"/>
+          </a:xfrm>
+          <a:prstGeom prst="straightConnector1">
+            <a:avLst/>
+          </a:prstGeom>
+          <a:ln w="12700">
+            <a:solidFill>
+              <a:schemeClr val="tx1"/>
+            </a:solidFill>
+            <a:tailEnd type="triangle"/>
+          </a:ln>
+        </p:spPr>
+        <p:style>
+          <a:lnRef idx="1">
+            <a:schemeClr val="accent1"/>
+          </a:lnRef>
+          <a:fillRef idx="0">
+            <a:schemeClr val="accent1"/>
+          </a:fillRef>
+          <a:effectRef idx="0">
+            <a:schemeClr val="accent1"/>
+          </a:effectRef>
+          <a:fontRef idx="minor">
+            <a:schemeClr val="tx1"/>
+          </a:fontRef>
+        </p:style>
+      </p:cxnSp>
+      <p:cxnSp>
+        <p:nvCxnSpPr>
+          <p:cNvPr id="13" name="Straight Arrow Connector 12"/>
+          <p:cNvCxnSpPr>
+            <a:endCxn id="4" idx="0"/>
+          </p:cNvCxnSpPr>
+          <p:nvPr/>
+        </p:nvCxnSpPr>
+        <p:spPr>
+          <a:xfrm>
+            <a:off x="1586184" y="7295"/>
+            <a:ext cx="0" cy="180460"/>
+          </a:xfrm>
+          <a:prstGeom prst="straightConnector1">
+            <a:avLst/>
+          </a:prstGeom>
+          <a:ln w="12700">
+            <a:solidFill>
+              <a:schemeClr val="tx1"/>
+            </a:solidFill>
+            <a:tailEnd type="triangle"/>
+          </a:ln>
+        </p:spPr>
+        <p:style>
+          <a:lnRef idx="1">
+            <a:schemeClr val="accent1"/>
+          </a:lnRef>
+          <a:fillRef idx="0">
+            <a:schemeClr val="accent1"/>
+          </a:fillRef>
+          <a:effectRef idx="0">
+            <a:schemeClr val="accent1"/>
+          </a:effectRef>
+          <a:fontRef idx="minor">
+            <a:schemeClr val="tx1"/>
+          </a:fontRef>
+        </p:style>
+      </p:cxnSp>
+    </p:spTree>
+    <p:extLst>
+      <p:ext uri="{BB962C8B-B14F-4D97-AF65-F5344CB8AC3E}">
+        <p14:creationId xmlns:p14="http://schemas.microsoft.com/office/powerpoint/2010/main" val="1213351542"/>
+      </p:ext>
+    </p:extLst>
+  </p:cSld>
+  <p:clrMapOvr>
+    <a:masterClrMapping/>
+  </p:clrMapOvr>
+</p:sld>
+</file>
+
+<file path=ppt/slides/slide3.xml><?xml version="1.0" encoding="utf-8"?>
+<p:sld xmlns:a="http://schemas.openxmlformats.org/drawingml/2006/main" xmlns:r="http://schemas.openxmlformats.org/officeDocument/2006/relationships" xmlns:p="http://schemas.openxmlformats.org/presentationml/2006/main">
+  <p:cSld>
+    <p:spTree>
+      <p:nvGrpSpPr>
+        <p:cNvPr id="1" name=""/>
+        <p:cNvGrpSpPr/>
+        <p:nvPr/>
+      </p:nvGrpSpPr>
+      <p:grpSpPr>
+        <a:xfrm>
+          <a:off x="0" y="0"/>
+          <a:ext cx="0" cy="0"/>
+          <a:chOff x="0" y="0"/>
+          <a:chExt cx="0" cy="0"/>
+        </a:xfrm>
+      </p:grpSpPr>
+      <p:sp>
+        <p:nvSpPr>
+          <p:cNvPr id="2" name="Rectangle 1"/>
+          <p:cNvSpPr/>
+          <p:nvPr/>
+        </p:nvSpPr>
+        <p:spPr>
+          <a:xfrm>
+            <a:off x="1153976" y="240995"/>
+            <a:ext cx="890026" cy="296675"/>
+          </a:xfrm>
+          <a:prstGeom prst="rect">
+            <a:avLst/>
+          </a:prstGeom>
+          <a:solidFill>
+            <a:srgbClr val="A6CEE3"/>
+          </a:solidFill>
+          <a:ln w="12700">
+            <a:solidFill>
+              <a:schemeClr val="tx1"/>
+            </a:solidFill>
+          </a:ln>
+        </p:spPr>
+        <p:style>
+          <a:lnRef idx="2">
+            <a:schemeClr val="accent1">
+              <a:shade val="50000"/>
+            </a:schemeClr>
+          </a:lnRef>
+          <a:fillRef idx="1">
+            <a:schemeClr val="accent1"/>
+          </a:fillRef>
+          <a:effectRef idx="0">
+            <a:schemeClr val="accent1"/>
+          </a:effectRef>
+          <a:fontRef idx="minor">
+            <a:schemeClr val="lt1"/>
+          </a:fontRef>
+        </p:style>
+        <p:txBody>
+          <a:bodyPr rtlCol="0" anchor="ctr"/>
+          <a:lstStyle/>
+          <a:p>
+            <a:pPr algn="ctr"/>
+            <a:r>
+              <a:rPr lang="en-US" sz="800" dirty="0" smtClean="0">
+                <a:solidFill>
+                  <a:schemeClr val="tx1"/>
+                </a:solidFill>
+                <a:latin typeface="Arial" pitchFamily="34" charset="0"/>
+                <a:cs typeface="Arial" pitchFamily="34" charset="0"/>
+              </a:rPr>
+              <a:t>0.0</a:t>
+            </a:r>
+          </a:p>
+          <a:p>
+            <a:pPr algn="ctr"/>
+            <a:r>
+              <a:rPr lang="en-US" sz="800" dirty="0" smtClean="0">
+                <a:solidFill>
+                  <a:schemeClr val="tx1"/>
+                </a:solidFill>
+                <a:latin typeface="Arial" pitchFamily="34" charset="0"/>
+                <a:cs typeface="Arial" pitchFamily="34" charset="0"/>
+              </a:rPr>
+              <a:t>c0.0_min = 2</a:t>
+            </a:r>
+            <a:endParaRPr lang="en-US" sz="800" dirty="0">
+              <a:solidFill>
+                <a:schemeClr val="tx1"/>
+              </a:solidFill>
+              <a:latin typeface="Arial" pitchFamily="34" charset="0"/>
+              <a:cs typeface="Arial" pitchFamily="34" charset="0"/>
+            </a:endParaRPr>
+          </a:p>
+        </p:txBody>
+      </p:sp>
+      <p:sp>
+        <p:nvSpPr>
+          <p:cNvPr id="3" name="Rectangle 2"/>
+          <p:cNvSpPr/>
+          <p:nvPr/>
+        </p:nvSpPr>
+        <p:spPr>
+          <a:xfrm>
+            <a:off x="486455" y="1358667"/>
+            <a:ext cx="890026" cy="296675"/>
+          </a:xfrm>
+          <a:prstGeom prst="rect">
+            <a:avLst/>
+          </a:prstGeom>
+          <a:solidFill>
+            <a:srgbClr val="A6CEE3"/>
+          </a:solidFill>
+          <a:ln w="12700">
+            <a:solidFill>
+              <a:schemeClr val="tx1"/>
+            </a:solidFill>
+          </a:ln>
+        </p:spPr>
+        <p:style>
+          <a:lnRef idx="2">
+            <a:schemeClr val="accent1">
+              <a:shade val="50000"/>
+            </a:schemeClr>
+          </a:lnRef>
+          <a:fillRef idx="1">
+            <a:schemeClr val="accent1"/>
+          </a:fillRef>
+          <a:effectRef idx="0">
+            <a:schemeClr val="accent1"/>
+          </a:effectRef>
+          <a:fontRef idx="minor">
+            <a:schemeClr val="lt1"/>
+          </a:fontRef>
+        </p:style>
+        <p:txBody>
+          <a:bodyPr rtlCol="0" anchor="ctr"/>
+          <a:lstStyle/>
+          <a:p>
+            <a:pPr algn="ctr"/>
+            <a:r>
+              <a:rPr lang="en-US" sz="800" dirty="0" smtClean="0">
+                <a:solidFill>
+                  <a:schemeClr val="tx1"/>
+                </a:solidFill>
+                <a:latin typeface="Arial" pitchFamily="34" charset="0"/>
+                <a:cs typeface="Arial" pitchFamily="34" charset="0"/>
+              </a:rPr>
+              <a:t>1.0</a:t>
+            </a:r>
+          </a:p>
+          <a:p>
+            <a:pPr algn="ctr"/>
+            <a:r>
+              <a:rPr lang="en-US" sz="800" dirty="0" smtClean="0">
+                <a:solidFill>
+                  <a:schemeClr val="tx1"/>
+                </a:solidFill>
+                <a:latin typeface="Arial" pitchFamily="34" charset="0"/>
+                <a:cs typeface="Arial" pitchFamily="34" charset="0"/>
+              </a:rPr>
+              <a:t>c1.0_min = 3</a:t>
+            </a:r>
+            <a:endParaRPr lang="en-US" sz="800" dirty="0">
+              <a:solidFill>
+                <a:schemeClr val="tx1"/>
+              </a:solidFill>
+              <a:latin typeface="Arial" pitchFamily="34" charset="0"/>
+              <a:cs typeface="Arial" pitchFamily="34" charset="0"/>
+            </a:endParaRPr>
+          </a:p>
+        </p:txBody>
+      </p:sp>
+      <p:sp>
+        <p:nvSpPr>
+          <p:cNvPr id="4" name="Rectangle 3"/>
+          <p:cNvSpPr/>
+          <p:nvPr/>
+        </p:nvSpPr>
+        <p:spPr>
+          <a:xfrm>
+            <a:off x="1821494" y="1358666"/>
+            <a:ext cx="890026" cy="296675"/>
+          </a:xfrm>
+          <a:prstGeom prst="rect">
+            <a:avLst/>
+          </a:prstGeom>
+          <a:solidFill>
+            <a:srgbClr val="FFFFCC"/>
+          </a:solidFill>
+          <a:ln w="12700">
+            <a:solidFill>
+              <a:schemeClr val="tx1"/>
+            </a:solidFill>
+          </a:ln>
+        </p:spPr>
+        <p:style>
+          <a:lnRef idx="2">
+            <a:schemeClr val="accent1">
+              <a:shade val="50000"/>
+            </a:schemeClr>
+          </a:lnRef>
+          <a:fillRef idx="1">
+            <a:schemeClr val="accent1"/>
+          </a:fillRef>
+          <a:effectRef idx="0">
+            <a:schemeClr val="accent1"/>
+          </a:effectRef>
+          <a:fontRef idx="minor">
+            <a:schemeClr val="lt1"/>
+          </a:fontRef>
+        </p:style>
+        <p:txBody>
+          <a:bodyPr rtlCol="0" anchor="ctr"/>
+          <a:lstStyle/>
+          <a:p>
+            <a:pPr algn="ctr"/>
+            <a:r>
+              <a:rPr lang="en-US" sz="800" dirty="0" smtClean="0">
+                <a:solidFill>
+                  <a:schemeClr val="tx1"/>
+                </a:solidFill>
+                <a:latin typeface="Arial" pitchFamily="34" charset="0"/>
+                <a:cs typeface="Arial" pitchFamily="34" charset="0"/>
+              </a:rPr>
+              <a:t>2.0</a:t>
+            </a:r>
+          </a:p>
+          <a:p>
+            <a:pPr algn="ctr"/>
+            <a:r>
+              <a:rPr lang="en-US" sz="800" smtClean="0">
+                <a:solidFill>
+                  <a:schemeClr val="tx1"/>
+                </a:solidFill>
+                <a:latin typeface="Arial" pitchFamily="34" charset="0"/>
+                <a:cs typeface="Arial" pitchFamily="34" charset="0"/>
+              </a:rPr>
+              <a:t>c2.0_min </a:t>
+            </a:r>
+            <a:r>
+              <a:rPr lang="en-US" sz="800" dirty="0" smtClean="0">
+                <a:solidFill>
+                  <a:schemeClr val="tx1"/>
+                </a:solidFill>
+                <a:latin typeface="Arial" pitchFamily="34" charset="0"/>
+                <a:cs typeface="Arial" pitchFamily="34" charset="0"/>
+              </a:rPr>
+              <a:t>= 5</a:t>
+            </a:r>
+            <a:endParaRPr lang="en-US" sz="800" dirty="0">
+              <a:solidFill>
+                <a:schemeClr val="tx1"/>
+              </a:solidFill>
+              <a:latin typeface="Arial" pitchFamily="34" charset="0"/>
+              <a:cs typeface="Arial" pitchFamily="34" charset="0"/>
+            </a:endParaRPr>
+          </a:p>
+        </p:txBody>
+      </p:sp>
+      <p:sp>
+        <p:nvSpPr>
+          <p:cNvPr id="5" name="Rectangle 4"/>
+          <p:cNvSpPr/>
+          <p:nvPr/>
+        </p:nvSpPr>
+        <p:spPr>
+          <a:xfrm>
+            <a:off x="1153976" y="2437375"/>
+            <a:ext cx="890026" cy="296675"/>
+          </a:xfrm>
+          <a:prstGeom prst="rect">
+            <a:avLst/>
+          </a:prstGeom>
+          <a:solidFill>
+            <a:srgbClr val="A6CEE3"/>
+          </a:solidFill>
+          <a:ln w="12700">
+            <a:solidFill>
+              <a:schemeClr val="tx1"/>
+            </a:solidFill>
+          </a:ln>
+        </p:spPr>
+        <p:style>
+          <a:lnRef idx="2">
+            <a:schemeClr val="accent1">
+              <a:shade val="50000"/>
+            </a:schemeClr>
+          </a:lnRef>
+          <a:fillRef idx="1">
+            <a:schemeClr val="accent1"/>
+          </a:fillRef>
+          <a:effectRef idx="0">
+            <a:schemeClr val="accent1"/>
+          </a:effectRef>
+          <a:fontRef idx="minor">
+            <a:schemeClr val="lt1"/>
+          </a:fontRef>
+        </p:style>
+        <p:txBody>
+          <a:bodyPr rtlCol="0" anchor="ctr"/>
+          <a:lstStyle/>
+          <a:p>
+            <a:pPr algn="ctr"/>
+            <a:r>
+              <a:rPr lang="en-US" sz="800" dirty="0" smtClean="0">
+                <a:solidFill>
+                  <a:schemeClr val="tx1"/>
+                </a:solidFill>
+                <a:latin typeface="Arial" pitchFamily="34" charset="0"/>
+                <a:cs typeface="Arial" pitchFamily="34" charset="0"/>
+              </a:rPr>
+              <a:t>3.0</a:t>
+            </a:r>
+          </a:p>
+          <a:p>
+            <a:pPr algn="ctr"/>
+            <a:r>
+              <a:rPr lang="en-US" sz="800" smtClean="0">
+                <a:solidFill>
+                  <a:schemeClr val="tx1"/>
+                </a:solidFill>
+                <a:latin typeface="Arial" pitchFamily="34" charset="0"/>
+                <a:cs typeface="Arial" pitchFamily="34" charset="0"/>
+              </a:rPr>
+              <a:t>c3.0_min </a:t>
+            </a:r>
+            <a:r>
+              <a:rPr lang="en-US" sz="800" dirty="0" smtClean="0">
+                <a:solidFill>
+                  <a:schemeClr val="tx1"/>
+                </a:solidFill>
+                <a:latin typeface="Arial" pitchFamily="34" charset="0"/>
+                <a:cs typeface="Arial" pitchFamily="34" charset="0"/>
+              </a:rPr>
+              <a:t>= 4</a:t>
+            </a:r>
+            <a:endParaRPr lang="en-US" sz="800" dirty="0">
+              <a:solidFill>
+                <a:schemeClr val="tx1"/>
+              </a:solidFill>
+              <a:latin typeface="Arial" pitchFamily="34" charset="0"/>
+              <a:cs typeface="Arial" pitchFamily="34" charset="0"/>
+            </a:endParaRPr>
+          </a:p>
+        </p:txBody>
+      </p:sp>
+      <p:cxnSp>
+        <p:nvCxnSpPr>
+          <p:cNvPr id="6" name="Straight Arrow Connector 5"/>
+          <p:cNvCxnSpPr>
+            <a:stCxn id="11" idx="2"/>
+            <a:endCxn id="3" idx="0"/>
+          </p:cNvCxnSpPr>
+          <p:nvPr/>
+        </p:nvCxnSpPr>
+        <p:spPr>
+          <a:xfrm flipH="1">
+            <a:off x="931468" y="1072070"/>
+            <a:ext cx="667521" cy="286597"/>
+          </a:xfrm>
+          <a:prstGeom prst="straightConnector1">
+            <a:avLst/>
+          </a:prstGeom>
+          <a:ln w="12700">
+            <a:solidFill>
+              <a:schemeClr val="tx1"/>
+            </a:solidFill>
+            <a:tailEnd type="triangle"/>
+          </a:ln>
+        </p:spPr>
+        <p:style>
+          <a:lnRef idx="1">
+            <a:schemeClr val="accent1"/>
+          </a:lnRef>
+          <a:fillRef idx="0">
+            <a:schemeClr val="accent1"/>
+          </a:fillRef>
+          <a:effectRef idx="0">
+            <a:schemeClr val="accent1"/>
+          </a:effectRef>
+          <a:fontRef idx="minor">
+            <a:schemeClr val="tx1"/>
+          </a:fontRef>
+        </p:style>
+      </p:cxnSp>
+      <p:cxnSp>
+        <p:nvCxnSpPr>
+          <p:cNvPr id="7" name="Straight Arrow Connector 6"/>
+          <p:cNvCxnSpPr>
+            <a:stCxn id="11" idx="2"/>
+            <a:endCxn id="4" idx="0"/>
+          </p:cNvCxnSpPr>
+          <p:nvPr/>
+        </p:nvCxnSpPr>
+        <p:spPr>
+          <a:xfrm>
+            <a:off x="1598989" y="1072070"/>
+            <a:ext cx="667518" cy="286596"/>
+          </a:xfrm>
+          <a:prstGeom prst="straightConnector1">
+            <a:avLst/>
+          </a:prstGeom>
+          <a:ln w="12700">
+            <a:solidFill>
+              <a:schemeClr val="tx1"/>
+            </a:solidFill>
+            <a:tailEnd type="triangle"/>
+          </a:ln>
+        </p:spPr>
+        <p:style>
+          <a:lnRef idx="1">
+            <a:schemeClr val="accent1"/>
+          </a:lnRef>
+          <a:fillRef idx="0">
+            <a:schemeClr val="accent1"/>
+          </a:fillRef>
+          <a:effectRef idx="0">
+            <a:schemeClr val="accent1"/>
+          </a:effectRef>
+          <a:fontRef idx="minor">
+            <a:schemeClr val="tx1"/>
+          </a:fontRef>
+        </p:style>
+      </p:cxnSp>
+      <p:cxnSp>
+        <p:nvCxnSpPr>
+          <p:cNvPr id="8" name="Straight Arrow Connector 7"/>
+          <p:cNvCxnSpPr>
+            <a:stCxn id="4" idx="2"/>
+            <a:endCxn id="5" idx="0"/>
+          </p:cNvCxnSpPr>
+          <p:nvPr/>
+        </p:nvCxnSpPr>
+        <p:spPr>
+          <a:xfrm flipH="1">
+            <a:off x="1598989" y="1655341"/>
+            <a:ext cx="667518" cy="782034"/>
+          </a:xfrm>
+          <a:prstGeom prst="straightConnector1">
+            <a:avLst/>
+          </a:prstGeom>
+          <a:ln w="12700">
+            <a:solidFill>
+              <a:schemeClr val="tx1"/>
+            </a:solidFill>
+            <a:tailEnd type="triangle"/>
+          </a:ln>
+        </p:spPr>
+        <p:style>
+          <a:lnRef idx="1">
+            <a:schemeClr val="accent1"/>
+          </a:lnRef>
+          <a:fillRef idx="0">
+            <a:schemeClr val="accent1"/>
+          </a:fillRef>
+          <a:effectRef idx="0">
+            <a:schemeClr val="accent1"/>
+          </a:effectRef>
+          <a:fontRef idx="minor">
+            <a:schemeClr val="tx1"/>
+          </a:fontRef>
+        </p:style>
+      </p:cxnSp>
+      <p:cxnSp>
+        <p:nvCxnSpPr>
+          <p:cNvPr id="9" name="Straight Arrow Connector 8"/>
+          <p:cNvCxnSpPr>
+            <a:stCxn id="5" idx="2"/>
+          </p:cNvCxnSpPr>
+          <p:nvPr/>
+        </p:nvCxnSpPr>
+        <p:spPr>
+          <a:xfrm flipH="1">
+            <a:off x="1598987" y="2734050"/>
+            <a:ext cx="2" cy="192025"/>
+          </a:xfrm>
+          <a:prstGeom prst="straightConnector1">
+            <a:avLst/>
+          </a:prstGeom>
+          <a:ln w="12700">
+            <a:solidFill>
+              <a:schemeClr val="tx1"/>
+            </a:solidFill>
+            <a:tailEnd type="triangle"/>
+          </a:ln>
+        </p:spPr>
+        <p:style>
+          <a:lnRef idx="1">
+            <a:schemeClr val="accent1"/>
+          </a:lnRef>
+          <a:fillRef idx="0">
+            <a:schemeClr val="accent1"/>
+          </a:fillRef>
+          <a:effectRef idx="0">
+            <a:schemeClr val="accent1"/>
+          </a:effectRef>
+          <a:fontRef idx="minor">
+            <a:schemeClr val="tx1"/>
+          </a:fontRef>
+        </p:style>
+      </p:cxnSp>
+      <p:cxnSp>
+        <p:nvCxnSpPr>
+          <p:cNvPr id="10" name="Straight Arrow Connector 9"/>
+          <p:cNvCxnSpPr>
+            <a:endCxn id="2" idx="0"/>
+          </p:cNvCxnSpPr>
+          <p:nvPr/>
+        </p:nvCxnSpPr>
+        <p:spPr>
+          <a:xfrm>
+            <a:off x="1598989" y="42772"/>
+            <a:ext cx="0" cy="198223"/>
+          </a:xfrm>
+          <a:prstGeom prst="straightConnector1">
+            <a:avLst/>
+          </a:prstGeom>
+          <a:ln w="12700">
+            <a:solidFill>
+              <a:schemeClr val="tx1"/>
+            </a:solidFill>
+            <a:tailEnd type="triangle"/>
+          </a:ln>
+        </p:spPr>
+        <p:style>
+          <a:lnRef idx="1">
+            <a:schemeClr val="accent1"/>
+          </a:lnRef>
+          <a:fillRef idx="0">
+            <a:schemeClr val="accent1"/>
+          </a:fillRef>
+          <a:effectRef idx="0">
+            <a:schemeClr val="accent1"/>
+          </a:effectRef>
+          <a:fontRef idx="minor">
+            <a:schemeClr val="tx1"/>
+          </a:fontRef>
+        </p:style>
+      </p:cxnSp>
+      <p:sp>
+        <p:nvSpPr>
+          <p:cNvPr id="11" name="Rectangle 10"/>
+          <p:cNvSpPr/>
+          <p:nvPr/>
+        </p:nvSpPr>
+        <p:spPr>
+          <a:xfrm>
+            <a:off x="1153976" y="775395"/>
+            <a:ext cx="890026" cy="296675"/>
+          </a:xfrm>
+          <a:prstGeom prst="rect">
+            <a:avLst/>
+          </a:prstGeom>
+          <a:solidFill>
+            <a:srgbClr val="FFFFCC"/>
+          </a:solidFill>
+          <a:ln w="12700">
+            <a:solidFill>
+              <a:schemeClr val="tx1"/>
+            </a:solidFill>
+          </a:ln>
+        </p:spPr>
+        <p:style>
+          <a:lnRef idx="2">
+            <a:schemeClr val="accent1">
+              <a:shade val="50000"/>
+            </a:schemeClr>
+          </a:lnRef>
+          <a:fillRef idx="1">
+            <a:schemeClr val="accent1"/>
+          </a:fillRef>
+          <a:effectRef idx="0">
+            <a:schemeClr val="accent1"/>
+          </a:effectRef>
+          <a:fontRef idx="minor">
+            <a:schemeClr val="lt1"/>
+          </a:fontRef>
+        </p:style>
+        <p:txBody>
+          <a:bodyPr rtlCol="0" anchor="ctr"/>
+          <a:lstStyle/>
+          <a:p>
+            <a:pPr algn="ctr"/>
+            <a:r>
+              <a:rPr lang="en-US" sz="800" dirty="0" smtClean="0">
+                <a:solidFill>
+                  <a:schemeClr val="tx1"/>
+                </a:solidFill>
+                <a:latin typeface="Arial" pitchFamily="34" charset="0"/>
+                <a:cs typeface="Arial" pitchFamily="34" charset="0"/>
+              </a:rPr>
+              <a:t>0.1</a:t>
+            </a:r>
+          </a:p>
+          <a:p>
+            <a:pPr algn="ctr"/>
+            <a:r>
+              <a:rPr lang="en-US" sz="800" dirty="0" smtClean="0">
+                <a:solidFill>
+                  <a:schemeClr val="tx1"/>
+                </a:solidFill>
+                <a:latin typeface="Arial" pitchFamily="34" charset="0"/>
+                <a:cs typeface="Arial" pitchFamily="34" charset="0"/>
+              </a:rPr>
+              <a:t>c0.1_min = 1</a:t>
+            </a:r>
+            <a:endParaRPr lang="en-US" sz="800" dirty="0">
+              <a:solidFill>
+                <a:schemeClr val="tx1"/>
+              </a:solidFill>
+              <a:latin typeface="Arial" pitchFamily="34" charset="0"/>
+              <a:cs typeface="Arial" pitchFamily="34" charset="0"/>
+            </a:endParaRPr>
+          </a:p>
+        </p:txBody>
+      </p:sp>
+      <p:cxnSp>
+        <p:nvCxnSpPr>
+          <p:cNvPr id="12" name="Straight Arrow Connector 11"/>
+          <p:cNvCxnSpPr>
+            <a:stCxn id="2" idx="2"/>
+            <a:endCxn id="11" idx="0"/>
+          </p:cNvCxnSpPr>
+          <p:nvPr/>
+        </p:nvCxnSpPr>
+        <p:spPr>
+          <a:xfrm>
+            <a:off x="1598989" y="537670"/>
+            <a:ext cx="0" cy="237725"/>
+          </a:xfrm>
+          <a:prstGeom prst="straightConnector1">
+            <a:avLst/>
+          </a:prstGeom>
+          <a:ln w="12700">
+            <a:solidFill>
+              <a:schemeClr val="tx1"/>
+            </a:solidFill>
+            <a:tailEnd type="triangle"/>
+          </a:ln>
+        </p:spPr>
+        <p:style>
+          <a:lnRef idx="1">
+            <a:schemeClr val="accent1"/>
+          </a:lnRef>
+          <a:fillRef idx="0">
+            <a:schemeClr val="accent1"/>
+          </a:fillRef>
+          <a:effectRef idx="0">
+            <a:schemeClr val="accent1"/>
+          </a:effectRef>
+          <a:fontRef idx="minor">
+            <a:schemeClr val="tx1"/>
+          </a:fontRef>
+        </p:style>
+      </p:cxnSp>
+      <p:sp>
+        <p:nvSpPr>
+          <p:cNvPr id="13" name="Rectangle 12"/>
+          <p:cNvSpPr/>
+          <p:nvPr/>
+        </p:nvSpPr>
+        <p:spPr>
+          <a:xfrm>
+            <a:off x="486455" y="1850735"/>
+            <a:ext cx="890026" cy="296675"/>
+          </a:xfrm>
+          <a:prstGeom prst="rect">
+            <a:avLst/>
+          </a:prstGeom>
+          <a:solidFill>
+            <a:srgbClr val="FFFFCC"/>
+          </a:solidFill>
+          <a:ln w="12700">
+            <a:solidFill>
+              <a:schemeClr val="tx1"/>
+            </a:solidFill>
+          </a:ln>
+        </p:spPr>
+        <p:style>
+          <a:lnRef idx="2">
+            <a:schemeClr val="accent1">
+              <a:shade val="50000"/>
+            </a:schemeClr>
+          </a:lnRef>
+          <a:fillRef idx="1">
+            <a:schemeClr val="accent1"/>
+          </a:fillRef>
+          <a:effectRef idx="0">
+            <a:schemeClr val="accent1"/>
+          </a:effectRef>
+          <a:fontRef idx="minor">
+            <a:schemeClr val="lt1"/>
+          </a:fontRef>
+        </p:style>
+        <p:txBody>
+          <a:bodyPr rtlCol="0" anchor="ctr"/>
+          <a:lstStyle/>
+          <a:p>
+            <a:pPr algn="ctr"/>
+            <a:r>
+              <a:rPr lang="en-US" sz="800" dirty="0" smtClean="0">
+                <a:solidFill>
+                  <a:schemeClr val="tx1"/>
+                </a:solidFill>
+                <a:latin typeface="Arial" pitchFamily="34" charset="0"/>
+                <a:cs typeface="Arial" pitchFamily="34" charset="0"/>
+              </a:rPr>
+              <a:t>1.1</a:t>
+            </a:r>
+          </a:p>
+          <a:p>
+            <a:pPr algn="ctr"/>
+            <a:r>
+              <a:rPr lang="en-US" sz="800" dirty="0" smtClean="0">
+                <a:solidFill>
+                  <a:schemeClr val="tx1"/>
+                </a:solidFill>
+                <a:latin typeface="Arial" pitchFamily="34" charset="0"/>
+                <a:cs typeface="Arial" pitchFamily="34" charset="0"/>
+              </a:rPr>
+              <a:t>c1.1_min = 1</a:t>
+            </a:r>
+            <a:endParaRPr lang="en-US" sz="800" dirty="0">
+              <a:solidFill>
+                <a:schemeClr val="tx1"/>
+              </a:solidFill>
+              <a:latin typeface="Arial" pitchFamily="34" charset="0"/>
+              <a:cs typeface="Arial" pitchFamily="34" charset="0"/>
+            </a:endParaRPr>
+          </a:p>
+        </p:txBody>
+      </p:sp>
+      <p:cxnSp>
+        <p:nvCxnSpPr>
+          <p:cNvPr id="14" name="Straight Arrow Connector 13"/>
+          <p:cNvCxnSpPr>
+            <a:stCxn id="3" idx="2"/>
+            <a:endCxn id="13" idx="0"/>
+          </p:cNvCxnSpPr>
+          <p:nvPr/>
+        </p:nvCxnSpPr>
+        <p:spPr>
+          <a:xfrm>
+            <a:off x="931468" y="1655342"/>
+            <a:ext cx="0" cy="195393"/>
+          </a:xfrm>
+          <a:prstGeom prst="straightConnector1">
+            <a:avLst/>
+          </a:prstGeom>
+          <a:ln w="12700">
+            <a:solidFill>
+              <a:schemeClr val="tx1"/>
+            </a:solidFill>
+            <a:tailEnd type="triangle"/>
+          </a:ln>
+        </p:spPr>
+        <p:style>
+          <a:lnRef idx="1">
+            <a:schemeClr val="accent1"/>
+          </a:lnRef>
+          <a:fillRef idx="0">
+            <a:schemeClr val="accent1"/>
+          </a:fillRef>
+          <a:effectRef idx="0">
+            <a:schemeClr val="accent1"/>
+          </a:effectRef>
+          <a:fontRef idx="minor">
+            <a:schemeClr val="tx1"/>
+          </a:fontRef>
+        </p:style>
+      </p:cxnSp>
+      <p:cxnSp>
+        <p:nvCxnSpPr>
+          <p:cNvPr id="15" name="Straight Arrow Connector 14"/>
+          <p:cNvCxnSpPr>
+            <a:stCxn id="13" idx="2"/>
+            <a:endCxn id="5" idx="0"/>
+          </p:cNvCxnSpPr>
+          <p:nvPr/>
+        </p:nvCxnSpPr>
+        <p:spPr>
+          <a:xfrm>
+            <a:off x="931468" y="2147410"/>
+            <a:ext cx="667521" cy="289965"/>
+          </a:xfrm>
+          <a:prstGeom prst="straightConnector1">
+            <a:avLst/>
+          </a:prstGeom>
+          <a:ln w="12700">
+            <a:solidFill>
+              <a:schemeClr val="tx1"/>
+            </a:solidFill>
+            <a:tailEnd type="triangle"/>
+          </a:ln>
+        </p:spPr>
+        <p:style>
+          <a:lnRef idx="1">
+            <a:schemeClr val="accent1"/>
+          </a:lnRef>
+          <a:fillRef idx="0">
+            <a:schemeClr val="accent1"/>
+          </a:fillRef>
+          <a:effectRef idx="0">
+            <a:schemeClr val="accent1"/>
+          </a:effectRef>
+          <a:fontRef idx="minor">
+            <a:schemeClr val="tx1"/>
+          </a:fontRef>
+        </p:style>
+      </p:cxnSp>
+    </p:spTree>
+    <p:extLst>
+      <p:ext uri="{BB962C8B-B14F-4D97-AF65-F5344CB8AC3E}">
+        <p14:creationId xmlns:p14="http://schemas.microsoft.com/office/powerpoint/2010/main" val="3155210805"/>
+      </p:ext>
+    </p:extLst>
+  </p:cSld>
+  <p:clrMapOvr>
+    <a:masterClrMapping/>
+  </p:clrMapOvr>
+</p:sld>
+</file>
+
+<file path=ppt/slides/slide4.xml><?xml version="1.0" encoding="utf-8"?>
+<p:sld xmlns:a="http://schemas.openxmlformats.org/drawingml/2006/main" xmlns:r="http://schemas.openxmlformats.org/officeDocument/2006/relationships" xmlns:p="http://schemas.openxmlformats.org/presentationml/2006/main">
+  <p:cSld>
+    <p:spTree>
+      <p:nvGrpSpPr>
+        <p:cNvPr id="1" name=""/>
+        <p:cNvGrpSpPr/>
+        <p:nvPr/>
+      </p:nvGrpSpPr>
+      <p:grpSpPr>
+        <a:xfrm>
+          <a:off x="0" y="0"/>
+          <a:ext cx="0" cy="0"/>
+          <a:chOff x="0" y="0"/>
+          <a:chExt cx="0" cy="0"/>
+        </a:xfrm>
+      </p:grpSpPr>
+      <p:sp>
+        <p:nvSpPr>
+          <p:cNvPr id="2" name="TextBox 1"/>
+          <p:cNvSpPr txBox="1"/>
+          <p:nvPr/>
+        </p:nvSpPr>
+        <p:spPr>
+          <a:xfrm>
+            <a:off x="685800" y="0"/>
+            <a:ext cx="721155" cy="215444"/>
+          </a:xfrm>
+          <a:prstGeom prst="rect">
+            <a:avLst/>
+          </a:prstGeom>
+          <a:noFill/>
+        </p:spPr>
+        <p:txBody>
+          <a:bodyPr wrap="square" rtlCol="0">
+            <a:spAutoFit/>
+          </a:bodyPr>
+          <a:lstStyle/>
+          <a:p>
+            <a:pPr algn="ctr"/>
+            <a:r>
+              <a:rPr lang="en-US" sz="800" dirty="0" smtClean="0">
+                <a:latin typeface="Arial" pitchFamily="34" charset="0"/>
+                <a:cs typeface="Arial" pitchFamily="34" charset="0"/>
+              </a:rPr>
+              <a:t>main task</a:t>
+            </a:r>
+            <a:endParaRPr lang="en-US" sz="800" dirty="0">
+              <a:latin typeface="Arial" pitchFamily="34" charset="0"/>
+              <a:cs typeface="Arial" pitchFamily="34" charset="0"/>
+            </a:endParaRPr>
+          </a:p>
+        </p:txBody>
+      </p:sp>
+      <p:sp>
+        <p:nvSpPr>
+          <p:cNvPr id="3" name="TextBox 2"/>
+          <p:cNvSpPr txBox="1"/>
+          <p:nvPr/>
+        </p:nvSpPr>
+        <p:spPr>
+          <a:xfrm>
+            <a:off x="1743798" y="0"/>
+            <a:ext cx="914400" cy="215444"/>
+          </a:xfrm>
+          <a:prstGeom prst="rect">
+            <a:avLst/>
+          </a:prstGeom>
+          <a:noFill/>
+        </p:spPr>
+        <p:txBody>
+          <a:bodyPr wrap="square" rtlCol="0">
+            <a:spAutoFit/>
+          </a:bodyPr>
+          <a:lstStyle/>
+          <a:p>
+            <a:pPr algn="ctr"/>
+            <a:r>
+              <a:rPr lang="en-US" sz="800" dirty="0" smtClean="0">
+                <a:latin typeface="Arial" pitchFamily="34" charset="0"/>
+                <a:cs typeface="Arial" pitchFamily="34" charset="0"/>
+              </a:rPr>
+              <a:t>monitoring task</a:t>
+            </a:r>
+            <a:endParaRPr lang="en-US" sz="800" dirty="0">
+              <a:latin typeface="Arial" pitchFamily="34" charset="0"/>
+              <a:cs typeface="Arial" pitchFamily="34" charset="0"/>
+            </a:endParaRPr>
+          </a:p>
+        </p:txBody>
+      </p:sp>
+      <p:cxnSp>
+        <p:nvCxnSpPr>
+          <p:cNvPr id="4" name="Straight Arrow Connector 3"/>
+          <p:cNvCxnSpPr>
+            <a:stCxn id="2" idx="2"/>
+            <a:endCxn id="19" idx="0"/>
+          </p:cNvCxnSpPr>
+          <p:nvPr/>
+        </p:nvCxnSpPr>
+        <p:spPr>
+          <a:xfrm>
+            <a:off x="1046378" y="215444"/>
+            <a:ext cx="0" cy="219796"/>
+          </a:xfrm>
+          <a:prstGeom prst="straightConnector1">
+            <a:avLst/>
+          </a:prstGeom>
+          <a:ln w="12700">
+            <a:solidFill>
+              <a:schemeClr val="tx1"/>
+            </a:solidFill>
+            <a:tailEnd type="triangle"/>
+          </a:ln>
+        </p:spPr>
+        <p:style>
+          <a:lnRef idx="1">
+            <a:schemeClr val="accent1"/>
+          </a:lnRef>
+          <a:fillRef idx="0">
+            <a:schemeClr val="accent1"/>
+          </a:fillRef>
+          <a:effectRef idx="0">
+            <a:schemeClr val="accent1"/>
+          </a:effectRef>
+          <a:fontRef idx="minor">
+            <a:schemeClr val="tx1"/>
+          </a:fontRef>
+        </p:style>
+      </p:cxnSp>
+      <p:cxnSp>
+        <p:nvCxnSpPr>
+          <p:cNvPr id="5" name="Straight Arrow Connector 4"/>
+          <p:cNvCxnSpPr>
+            <a:stCxn id="3" idx="2"/>
+            <a:endCxn id="14" idx="0"/>
+          </p:cNvCxnSpPr>
+          <p:nvPr/>
+        </p:nvCxnSpPr>
+        <p:spPr>
+          <a:xfrm>
+            <a:off x="2200998" y="215444"/>
+            <a:ext cx="0" cy="219796"/>
+          </a:xfrm>
+          <a:prstGeom prst="straightConnector1">
+            <a:avLst/>
+          </a:prstGeom>
+          <a:ln w="12700">
+            <a:solidFill>
+              <a:schemeClr val="tx1"/>
+            </a:solidFill>
+            <a:tailEnd type="triangle"/>
+          </a:ln>
+        </p:spPr>
+        <p:style>
+          <a:lnRef idx="1">
+            <a:schemeClr val="accent1"/>
+          </a:lnRef>
+          <a:fillRef idx="0">
+            <a:schemeClr val="accent1"/>
+          </a:fillRef>
+          <a:effectRef idx="0">
+            <a:schemeClr val="accent1"/>
+          </a:effectRef>
+          <a:fontRef idx="minor">
+            <a:schemeClr val="tx1"/>
+          </a:fontRef>
+        </p:style>
+      </p:cxnSp>
+      <p:cxnSp>
+        <p:nvCxnSpPr>
+          <p:cNvPr id="6" name="Straight Arrow Connector 5"/>
+          <p:cNvCxnSpPr>
+            <a:stCxn id="14" idx="2"/>
+            <a:endCxn id="15" idx="0"/>
+          </p:cNvCxnSpPr>
+          <p:nvPr/>
+        </p:nvCxnSpPr>
+        <p:spPr>
+          <a:xfrm>
+            <a:off x="2200998" y="685800"/>
+            <a:ext cx="0" cy="215444"/>
+          </a:xfrm>
+          <a:prstGeom prst="straightConnector1">
+            <a:avLst/>
+          </a:prstGeom>
+          <a:ln w="12700">
+            <a:solidFill>
+              <a:schemeClr val="tx1"/>
+            </a:solidFill>
+            <a:tailEnd type="triangle"/>
+          </a:ln>
+        </p:spPr>
+        <p:style>
+          <a:lnRef idx="1">
+            <a:schemeClr val="accent1"/>
+          </a:lnRef>
+          <a:fillRef idx="0">
+            <a:schemeClr val="accent1"/>
+          </a:fillRef>
+          <a:effectRef idx="0">
+            <a:schemeClr val="accent1"/>
+          </a:effectRef>
+          <a:fontRef idx="minor">
+            <a:schemeClr val="tx1"/>
+          </a:fontRef>
+        </p:style>
+      </p:cxnSp>
+      <p:sp>
+        <p:nvSpPr>
+          <p:cNvPr id="7" name="TextBox 6"/>
+          <p:cNvSpPr txBox="1"/>
+          <p:nvPr/>
+        </p:nvSpPr>
+        <p:spPr>
+          <a:xfrm>
+            <a:off x="2200998" y="685800"/>
+            <a:ext cx="512075" cy="215444"/>
+          </a:xfrm>
+          <a:prstGeom prst="rect">
+            <a:avLst/>
+          </a:prstGeom>
+          <a:noFill/>
+        </p:spPr>
+        <p:txBody>
+          <a:bodyPr wrap="square" rtlCol="0">
+            <a:spAutoFit/>
+          </a:bodyPr>
+          <a:lstStyle/>
+          <a:p>
+            <a:r>
+              <a:rPr lang="en-US" sz="800" dirty="0" smtClean="0">
+                <a:latin typeface="Arial" pitchFamily="34" charset="0"/>
+                <a:cs typeface="Arial" pitchFamily="34" charset="0"/>
+              </a:rPr>
+              <a:t>WCET</a:t>
+            </a:r>
+            <a:endParaRPr lang="en-US" sz="800" dirty="0">
+              <a:latin typeface="Arial" pitchFamily="34" charset="0"/>
+              <a:cs typeface="Arial" pitchFamily="34" charset="0"/>
+            </a:endParaRPr>
+          </a:p>
+        </p:txBody>
+      </p:sp>
+      <p:cxnSp>
+        <p:nvCxnSpPr>
+          <p:cNvPr id="8" name="Straight Arrow Connector 7"/>
+          <p:cNvCxnSpPr/>
+          <p:nvPr/>
+        </p:nvCxnSpPr>
+        <p:spPr>
+          <a:xfrm>
+            <a:off x="1945845" y="775395"/>
+            <a:ext cx="0" cy="125849"/>
+          </a:xfrm>
+          <a:prstGeom prst="straightConnector1">
+            <a:avLst/>
+          </a:prstGeom>
+          <a:ln w="12700">
+            <a:solidFill>
+              <a:schemeClr val="tx1"/>
+            </a:solidFill>
+            <a:tailEnd type="triangle"/>
+          </a:ln>
+        </p:spPr>
+        <p:style>
+          <a:lnRef idx="1">
+            <a:schemeClr val="accent1"/>
+          </a:lnRef>
+          <a:fillRef idx="0">
+            <a:schemeClr val="accent1"/>
+          </a:fillRef>
+          <a:effectRef idx="0">
+            <a:schemeClr val="accent1"/>
+          </a:effectRef>
+          <a:fontRef idx="minor">
+            <a:schemeClr val="tx1"/>
+          </a:fontRef>
+        </p:style>
+      </p:cxnSp>
+      <p:cxnSp>
+        <p:nvCxnSpPr>
+          <p:cNvPr id="9" name="Straight Connector 8"/>
+          <p:cNvCxnSpPr/>
+          <p:nvPr/>
+        </p:nvCxnSpPr>
+        <p:spPr>
+          <a:xfrm>
+            <a:off x="1324612" y="685800"/>
+            <a:ext cx="0" cy="89595"/>
+          </a:xfrm>
+          <a:prstGeom prst="line">
+            <a:avLst/>
+          </a:prstGeom>
+          <a:ln w="12700">
+            <a:solidFill>
+              <a:schemeClr val="tx1"/>
+            </a:solidFill>
+          </a:ln>
+        </p:spPr>
+        <p:style>
+          <a:lnRef idx="1">
+            <a:schemeClr val="accent1"/>
+          </a:lnRef>
+          <a:fillRef idx="0">
+            <a:schemeClr val="accent1"/>
+          </a:fillRef>
+          <a:effectRef idx="0">
+            <a:schemeClr val="accent1"/>
+          </a:effectRef>
+          <a:fontRef idx="minor">
+            <a:schemeClr val="tx1"/>
+          </a:fontRef>
+        </p:style>
+      </p:cxnSp>
+      <p:cxnSp>
+        <p:nvCxnSpPr>
+          <p:cNvPr id="10" name="Straight Connector 9"/>
+          <p:cNvCxnSpPr/>
+          <p:nvPr/>
+        </p:nvCxnSpPr>
+        <p:spPr>
+          <a:xfrm>
+            <a:off x="1324612" y="775395"/>
+            <a:ext cx="621233" cy="0"/>
+          </a:xfrm>
+          <a:prstGeom prst="line">
+            <a:avLst/>
+          </a:prstGeom>
+          <a:ln w="12700">
+            <a:solidFill>
+              <a:schemeClr val="tx1"/>
+            </a:solidFill>
+          </a:ln>
+        </p:spPr>
+        <p:style>
+          <a:lnRef idx="1">
+            <a:schemeClr val="accent1"/>
+          </a:lnRef>
+          <a:fillRef idx="0">
+            <a:schemeClr val="accent1"/>
+          </a:fillRef>
+          <a:effectRef idx="0">
+            <a:schemeClr val="accent1"/>
+          </a:effectRef>
+          <a:fontRef idx="minor">
+            <a:schemeClr val="tx1"/>
+          </a:fontRef>
+        </p:style>
+      </p:cxnSp>
+      <p:cxnSp>
+        <p:nvCxnSpPr>
+          <p:cNvPr id="11" name="Straight Arrow Connector 10"/>
+          <p:cNvCxnSpPr>
+            <a:stCxn id="19" idx="2"/>
+          </p:cNvCxnSpPr>
+          <p:nvPr/>
+        </p:nvCxnSpPr>
+        <p:spPr>
+          <a:xfrm flipH="1">
+            <a:off x="1046377" y="685800"/>
+            <a:ext cx="1" cy="1241745"/>
+          </a:xfrm>
+          <a:prstGeom prst="straightConnector1">
+            <a:avLst/>
+          </a:prstGeom>
+          <a:ln w="12700">
+            <a:solidFill>
+              <a:schemeClr val="tx1"/>
+            </a:solidFill>
+            <a:headEnd type="none" w="med" len="med"/>
+            <a:tailEnd type="triangle" w="med" len="med"/>
+          </a:ln>
+        </p:spPr>
+        <p:style>
+          <a:lnRef idx="1">
+            <a:schemeClr val="accent1"/>
+          </a:lnRef>
+          <a:fillRef idx="0">
+            <a:schemeClr val="accent1"/>
+          </a:fillRef>
+          <a:effectRef idx="0">
+            <a:schemeClr val="accent1"/>
+          </a:effectRef>
+          <a:fontRef idx="minor">
+            <a:schemeClr val="tx1"/>
+          </a:fontRef>
+        </p:style>
+      </p:cxnSp>
+      <p:sp>
+        <p:nvSpPr>
+          <p:cNvPr id="12" name="TextBox 11"/>
+          <p:cNvSpPr txBox="1"/>
+          <p:nvPr/>
+        </p:nvSpPr>
+        <p:spPr>
+          <a:xfrm>
+            <a:off x="721155" y="1151804"/>
+            <a:ext cx="533400" cy="215444"/>
+          </a:xfrm>
+          <a:prstGeom prst="rect">
+            <a:avLst/>
+          </a:prstGeom>
+          <a:noFill/>
+        </p:spPr>
+        <p:txBody>
+          <a:bodyPr wrap="square" rtlCol="0">
+            <a:spAutoFit/>
+          </a:bodyPr>
+          <a:lstStyle/>
+          <a:p>
+            <a:r>
+              <a:rPr lang="en-US" sz="800" dirty="0" smtClean="0">
+                <a:latin typeface="Arial" pitchFamily="34" charset="0"/>
+                <a:cs typeface="Arial" pitchFamily="34" charset="0"/>
+              </a:rPr>
+              <a:t>ILP</a:t>
+            </a:r>
+            <a:endParaRPr lang="en-US" sz="800" dirty="0">
+              <a:latin typeface="Arial" pitchFamily="34" charset="0"/>
+              <a:cs typeface="Arial" pitchFamily="34" charset="0"/>
+            </a:endParaRPr>
+          </a:p>
+        </p:txBody>
+      </p:sp>
+      <p:sp>
+        <p:nvSpPr>
+          <p:cNvPr id="13" name="TextBox 12"/>
+          <p:cNvSpPr txBox="1"/>
+          <p:nvPr/>
+        </p:nvSpPr>
+        <p:spPr>
+          <a:xfrm>
+            <a:off x="1254555" y="751976"/>
+            <a:ext cx="457199" cy="215444"/>
+          </a:xfrm>
+          <a:prstGeom prst="rect">
+            <a:avLst/>
+          </a:prstGeom>
+          <a:noFill/>
+        </p:spPr>
+        <p:txBody>
+          <a:bodyPr wrap="square" rtlCol="0">
+            <a:spAutoFit/>
+          </a:bodyPr>
+          <a:lstStyle/>
+          <a:p>
+            <a:r>
+              <a:rPr lang="en-US" sz="800" dirty="0" smtClean="0">
+                <a:latin typeface="Arial" pitchFamily="34" charset="0"/>
+                <a:cs typeface="Arial" pitchFamily="34" charset="0"/>
+              </a:rPr>
+              <a:t>MFG</a:t>
+            </a:r>
+            <a:endParaRPr lang="en-US" sz="800" dirty="0">
+              <a:latin typeface="Arial" pitchFamily="34" charset="0"/>
+              <a:cs typeface="Arial" pitchFamily="34" charset="0"/>
+            </a:endParaRPr>
+          </a:p>
+        </p:txBody>
+      </p:sp>
+      <p:sp>
+        <p:nvSpPr>
+          <p:cNvPr id="14" name="Rectangle 13"/>
+          <p:cNvSpPr/>
+          <p:nvPr/>
+        </p:nvSpPr>
+        <p:spPr>
+          <a:xfrm>
+            <a:off x="1794695" y="435240"/>
+            <a:ext cx="812605" cy="250560"/>
+          </a:xfrm>
+          <a:prstGeom prst="rect">
+            <a:avLst/>
+          </a:prstGeom>
+          <a:solidFill>
+            <a:srgbClr val="FFFFCC"/>
+          </a:solidFill>
+          <a:ln w="12700">
+            <a:solidFill>
+              <a:schemeClr val="tx1"/>
+            </a:solidFill>
+          </a:ln>
+        </p:spPr>
+        <p:style>
+          <a:lnRef idx="2">
+            <a:schemeClr val="accent1">
+              <a:shade val="50000"/>
+            </a:schemeClr>
+          </a:lnRef>
+          <a:fillRef idx="1">
+            <a:schemeClr val="accent1"/>
+          </a:fillRef>
+          <a:effectRef idx="0">
+            <a:schemeClr val="accent1"/>
+          </a:effectRef>
+          <a:fontRef idx="minor">
+            <a:schemeClr val="lt1"/>
+          </a:fontRef>
+        </p:style>
+        <p:txBody>
+          <a:bodyPr rtlCol="0" anchor="ctr"/>
+          <a:lstStyle/>
+          <a:p>
+            <a:pPr algn="ctr"/>
+            <a:r>
+              <a:rPr lang="en-US" sz="800" dirty="0" err="1" smtClean="0">
+                <a:solidFill>
+                  <a:schemeClr val="tx1"/>
+                </a:solidFill>
+                <a:latin typeface="Arial" pitchFamily="34" charset="0"/>
+                <a:cs typeface="Arial" pitchFamily="34" charset="0"/>
+              </a:rPr>
+              <a:t>Chronos</a:t>
+            </a:r>
+            <a:endParaRPr lang="en-US" sz="800" dirty="0">
+              <a:solidFill>
+                <a:schemeClr val="tx1"/>
+              </a:solidFill>
+              <a:latin typeface="Arial" pitchFamily="34" charset="0"/>
+              <a:cs typeface="Arial" pitchFamily="34" charset="0"/>
+            </a:endParaRPr>
+          </a:p>
+        </p:txBody>
+      </p:sp>
+      <p:sp>
+        <p:nvSpPr>
+          <p:cNvPr id="15" name="Rectangle 14"/>
+          <p:cNvSpPr/>
+          <p:nvPr/>
+        </p:nvSpPr>
+        <p:spPr>
+          <a:xfrm>
+            <a:off x="1794695" y="901244"/>
+            <a:ext cx="812605" cy="250560"/>
+          </a:xfrm>
+          <a:prstGeom prst="rect">
+            <a:avLst/>
+          </a:prstGeom>
+          <a:solidFill>
+            <a:srgbClr val="FFFFCC"/>
+          </a:solidFill>
+          <a:ln w="12700">
+            <a:solidFill>
+              <a:schemeClr val="tx1"/>
+            </a:solidFill>
+          </a:ln>
+        </p:spPr>
+        <p:style>
+          <a:lnRef idx="2">
+            <a:schemeClr val="accent1">
+              <a:shade val="50000"/>
+            </a:schemeClr>
+          </a:lnRef>
+          <a:fillRef idx="1">
+            <a:schemeClr val="accent1"/>
+          </a:fillRef>
+          <a:effectRef idx="0">
+            <a:schemeClr val="accent1"/>
+          </a:effectRef>
+          <a:fontRef idx="minor">
+            <a:schemeClr val="lt1"/>
+          </a:fontRef>
+        </p:style>
+        <p:txBody>
+          <a:bodyPr rtlCol="0" anchor="ctr"/>
+          <a:lstStyle/>
+          <a:p>
+            <a:pPr algn="ctr"/>
+            <a:r>
+              <a:rPr lang="en-US" sz="800" dirty="0" smtClean="0">
+                <a:solidFill>
+                  <a:schemeClr val="tx1"/>
+                </a:solidFill>
+                <a:latin typeface="Arial" pitchFamily="34" charset="0"/>
+                <a:cs typeface="Arial" pitchFamily="34" charset="0"/>
+              </a:rPr>
+              <a:t>create MILP</a:t>
+            </a:r>
+            <a:endParaRPr lang="en-US" sz="800" dirty="0">
+              <a:solidFill>
+                <a:schemeClr val="tx1"/>
+              </a:solidFill>
+              <a:latin typeface="Arial" pitchFamily="34" charset="0"/>
+              <a:cs typeface="Arial" pitchFamily="34" charset="0"/>
+            </a:endParaRPr>
+          </a:p>
+        </p:txBody>
+      </p:sp>
+      <p:sp>
+        <p:nvSpPr>
+          <p:cNvPr id="16" name="Rectangle 15"/>
+          <p:cNvSpPr/>
+          <p:nvPr/>
+        </p:nvSpPr>
+        <p:spPr>
+          <a:xfrm>
+            <a:off x="1794694" y="1367248"/>
+            <a:ext cx="812605" cy="250560"/>
+          </a:xfrm>
+          <a:prstGeom prst="rect">
+            <a:avLst/>
+          </a:prstGeom>
+          <a:solidFill>
+            <a:srgbClr val="FFFFCC"/>
+          </a:solidFill>
+          <a:ln w="12700">
+            <a:solidFill>
+              <a:schemeClr val="tx1"/>
+            </a:solidFill>
+          </a:ln>
+        </p:spPr>
+        <p:style>
+          <a:lnRef idx="2">
+            <a:schemeClr val="accent1">
+              <a:shade val="50000"/>
+            </a:schemeClr>
+          </a:lnRef>
+          <a:fillRef idx="1">
+            <a:schemeClr val="accent1"/>
+          </a:fillRef>
+          <a:effectRef idx="0">
+            <a:schemeClr val="accent1"/>
+          </a:effectRef>
+          <a:fontRef idx="minor">
+            <a:schemeClr val="lt1"/>
+          </a:fontRef>
+        </p:style>
+        <p:txBody>
+          <a:bodyPr rtlCol="0" anchor="ctr"/>
+          <a:lstStyle/>
+          <a:p>
+            <a:pPr algn="ctr"/>
+            <a:r>
+              <a:rPr lang="en-US" sz="800" dirty="0" err="1" smtClean="0">
+                <a:solidFill>
+                  <a:schemeClr val="tx1"/>
+                </a:solidFill>
+                <a:latin typeface="Arial" pitchFamily="34" charset="0"/>
+                <a:cs typeface="Arial" pitchFamily="34" charset="0"/>
+              </a:rPr>
+              <a:t>lp_solve</a:t>
+            </a:r>
+            <a:endParaRPr lang="en-US" sz="800" dirty="0">
+              <a:solidFill>
+                <a:schemeClr val="tx1"/>
+              </a:solidFill>
+              <a:latin typeface="Arial" pitchFamily="34" charset="0"/>
+              <a:cs typeface="Arial" pitchFamily="34" charset="0"/>
+            </a:endParaRPr>
+          </a:p>
+        </p:txBody>
+      </p:sp>
+      <p:cxnSp>
+        <p:nvCxnSpPr>
+          <p:cNvPr id="17" name="Straight Arrow Connector 16"/>
+          <p:cNvCxnSpPr>
+            <a:stCxn id="15" idx="2"/>
+            <a:endCxn id="16" idx="0"/>
+          </p:cNvCxnSpPr>
+          <p:nvPr/>
+        </p:nvCxnSpPr>
+        <p:spPr>
+          <a:xfrm flipH="1">
+            <a:off x="2200997" y="1151804"/>
+            <a:ext cx="1" cy="215444"/>
+          </a:xfrm>
+          <a:prstGeom prst="straightConnector1">
+            <a:avLst/>
+          </a:prstGeom>
+          <a:ln w="12700">
+            <a:solidFill>
+              <a:schemeClr val="tx1"/>
+            </a:solidFill>
+            <a:headEnd type="none" w="med" len="med"/>
+            <a:tailEnd type="triangle" w="med" len="med"/>
+          </a:ln>
+        </p:spPr>
+        <p:style>
+          <a:lnRef idx="1">
+            <a:schemeClr val="accent1"/>
+          </a:lnRef>
+          <a:fillRef idx="0">
+            <a:schemeClr val="accent1"/>
+          </a:fillRef>
+          <a:effectRef idx="0">
+            <a:schemeClr val="accent1"/>
+          </a:effectRef>
+          <a:fontRef idx="minor">
+            <a:schemeClr val="tx1"/>
+          </a:fontRef>
+        </p:style>
+      </p:cxnSp>
+      <p:sp>
+        <p:nvSpPr>
+          <p:cNvPr id="18" name="TextBox 17"/>
+          <p:cNvSpPr txBox="1"/>
+          <p:nvPr/>
+        </p:nvSpPr>
+        <p:spPr>
+          <a:xfrm>
+            <a:off x="2200998" y="1151804"/>
+            <a:ext cx="499265" cy="215444"/>
+          </a:xfrm>
+          <a:prstGeom prst="rect">
+            <a:avLst/>
+          </a:prstGeom>
+          <a:noFill/>
+        </p:spPr>
+        <p:txBody>
+          <a:bodyPr wrap="square" rtlCol="0">
+            <a:spAutoFit/>
+          </a:bodyPr>
+          <a:lstStyle/>
+          <a:p>
+            <a:r>
+              <a:rPr lang="en-US" sz="800" dirty="0" smtClean="0">
+                <a:latin typeface="Arial" pitchFamily="34" charset="0"/>
+                <a:cs typeface="Arial" pitchFamily="34" charset="0"/>
+              </a:rPr>
+              <a:t>MILP</a:t>
+            </a:r>
+            <a:endParaRPr lang="en-US" sz="800" dirty="0">
+              <a:latin typeface="Arial" pitchFamily="34" charset="0"/>
+              <a:cs typeface="Arial" pitchFamily="34" charset="0"/>
+            </a:endParaRPr>
+          </a:p>
+        </p:txBody>
+      </p:sp>
+      <p:sp>
+        <p:nvSpPr>
+          <p:cNvPr id="19" name="Rectangle 18"/>
+          <p:cNvSpPr/>
+          <p:nvPr/>
+        </p:nvSpPr>
+        <p:spPr>
+          <a:xfrm>
+            <a:off x="640075" y="435240"/>
+            <a:ext cx="812605" cy="250560"/>
+          </a:xfrm>
+          <a:prstGeom prst="rect">
+            <a:avLst/>
+          </a:prstGeom>
+          <a:solidFill>
+            <a:srgbClr val="FFFFCC"/>
+          </a:solidFill>
+          <a:ln w="12700">
+            <a:solidFill>
+              <a:schemeClr val="tx1"/>
+            </a:solidFill>
+          </a:ln>
+        </p:spPr>
+        <p:style>
+          <a:lnRef idx="2">
+            <a:schemeClr val="accent1">
+              <a:shade val="50000"/>
+            </a:schemeClr>
+          </a:lnRef>
+          <a:fillRef idx="1">
+            <a:schemeClr val="accent1"/>
+          </a:fillRef>
+          <a:effectRef idx="0">
+            <a:schemeClr val="accent1"/>
+          </a:effectRef>
+          <a:fontRef idx="minor">
+            <a:schemeClr val="lt1"/>
+          </a:fontRef>
+        </p:style>
+        <p:txBody>
+          <a:bodyPr rtlCol="0" anchor="ctr"/>
+          <a:lstStyle/>
+          <a:p>
+            <a:pPr algn="ctr"/>
+            <a:r>
+              <a:rPr lang="en-US" sz="800" dirty="0" err="1" smtClean="0">
+                <a:solidFill>
+                  <a:schemeClr val="tx1"/>
+                </a:solidFill>
+                <a:latin typeface="Arial" pitchFamily="34" charset="0"/>
+                <a:cs typeface="Arial" pitchFamily="34" charset="0"/>
+              </a:rPr>
+              <a:t>Chronos</a:t>
+            </a:r>
+            <a:endParaRPr lang="en-US" sz="800" dirty="0">
+              <a:solidFill>
+                <a:schemeClr val="tx1"/>
+              </a:solidFill>
+              <a:latin typeface="Arial" pitchFamily="34" charset="0"/>
+              <a:cs typeface="Arial" pitchFamily="34" charset="0"/>
+            </a:endParaRPr>
+          </a:p>
+        </p:txBody>
+      </p:sp>
+      <p:cxnSp>
+        <p:nvCxnSpPr>
+          <p:cNvPr id="20" name="Straight Arrow Connector 19"/>
+          <p:cNvCxnSpPr>
+            <a:stCxn id="16" idx="2"/>
+          </p:cNvCxnSpPr>
+          <p:nvPr/>
+        </p:nvCxnSpPr>
+        <p:spPr>
+          <a:xfrm flipH="1">
+            <a:off x="2200996" y="1617808"/>
+            <a:ext cx="1" cy="309737"/>
+          </a:xfrm>
+          <a:prstGeom prst="straightConnector1">
+            <a:avLst/>
+          </a:prstGeom>
+          <a:ln w="12700">
+            <a:solidFill>
+              <a:schemeClr val="tx1"/>
+            </a:solidFill>
+            <a:headEnd type="none" w="med" len="med"/>
+            <a:tailEnd type="triangle" w="med" len="med"/>
+          </a:ln>
+        </p:spPr>
+        <p:style>
+          <a:lnRef idx="1">
+            <a:schemeClr val="accent1"/>
+          </a:lnRef>
+          <a:fillRef idx="0">
+            <a:schemeClr val="accent1"/>
+          </a:fillRef>
+          <a:effectRef idx="0">
+            <a:schemeClr val="accent1"/>
+          </a:effectRef>
+          <a:fontRef idx="minor">
+            <a:schemeClr val="tx1"/>
+          </a:fontRef>
+        </p:style>
+      </p:cxnSp>
+      <p:sp>
+        <p:nvSpPr>
+          <p:cNvPr id="21" name="TextBox 20"/>
+          <p:cNvSpPr txBox="1"/>
+          <p:nvPr/>
+        </p:nvSpPr>
+        <p:spPr>
+          <a:xfrm>
+            <a:off x="2200996" y="1617808"/>
+            <a:ext cx="972935" cy="215444"/>
+          </a:xfrm>
+          <a:prstGeom prst="rect">
+            <a:avLst/>
+          </a:prstGeom>
+          <a:noFill/>
+        </p:spPr>
+        <p:txBody>
+          <a:bodyPr wrap="square" rtlCol="0">
+            <a:spAutoFit/>
+          </a:bodyPr>
+          <a:lstStyle/>
+          <a:p>
+            <a:r>
+              <a:rPr lang="en-US" sz="800" dirty="0" smtClean="0">
+                <a:latin typeface="Arial" pitchFamily="34" charset="0"/>
+                <a:cs typeface="Arial" pitchFamily="34" charset="0"/>
+              </a:rPr>
+              <a:t>monitoring stalls</a:t>
+            </a:r>
+            <a:endParaRPr lang="en-US" sz="800" dirty="0">
+              <a:latin typeface="Arial" pitchFamily="34" charset="0"/>
+              <a:cs typeface="Arial" pitchFamily="34" charset="0"/>
+            </a:endParaRPr>
+          </a:p>
+        </p:txBody>
+      </p:sp>
+      <p:sp>
+        <p:nvSpPr>
+          <p:cNvPr id="22" name="Rectangle 21"/>
+          <p:cNvSpPr/>
+          <p:nvPr/>
+        </p:nvSpPr>
+        <p:spPr>
+          <a:xfrm>
+            <a:off x="640075" y="1927545"/>
+            <a:ext cx="1967224" cy="250560"/>
+          </a:xfrm>
+          <a:prstGeom prst="rect">
+            <a:avLst/>
+          </a:prstGeom>
+          <a:solidFill>
+            <a:srgbClr val="FFFFCC"/>
+          </a:solidFill>
+          <a:ln w="12700">
+            <a:solidFill>
+              <a:schemeClr val="tx1"/>
+            </a:solidFill>
+          </a:ln>
+        </p:spPr>
+        <p:style>
+          <a:lnRef idx="2">
+            <a:schemeClr val="accent1">
+              <a:shade val="50000"/>
+            </a:schemeClr>
+          </a:lnRef>
+          <a:fillRef idx="1">
+            <a:schemeClr val="accent1"/>
+          </a:fillRef>
+          <a:effectRef idx="0">
+            <a:schemeClr val="accent1"/>
+          </a:effectRef>
+          <a:fontRef idx="minor">
+            <a:schemeClr val="lt1"/>
+          </a:fontRef>
+        </p:style>
+        <p:txBody>
+          <a:bodyPr rtlCol="0" anchor="ctr"/>
+          <a:lstStyle/>
+          <a:p>
+            <a:pPr algn="ctr"/>
+            <a:r>
+              <a:rPr lang="en-US" sz="800" dirty="0" smtClean="0">
+                <a:solidFill>
+                  <a:schemeClr val="tx1"/>
+                </a:solidFill>
+                <a:latin typeface="Arial" pitchFamily="34" charset="0"/>
+                <a:cs typeface="Arial" pitchFamily="34" charset="0"/>
+              </a:rPr>
+              <a:t>incorporate stalls</a:t>
+            </a:r>
+            <a:endParaRPr lang="en-US" sz="800" dirty="0">
+              <a:solidFill>
+                <a:schemeClr val="tx1"/>
+              </a:solidFill>
+              <a:latin typeface="Arial" pitchFamily="34" charset="0"/>
+              <a:cs typeface="Arial" pitchFamily="34" charset="0"/>
+            </a:endParaRPr>
+          </a:p>
+        </p:txBody>
+      </p:sp>
+      <p:cxnSp>
+        <p:nvCxnSpPr>
+          <p:cNvPr id="23" name="Straight Arrow Connector 22"/>
+          <p:cNvCxnSpPr>
+            <a:stCxn id="22" idx="2"/>
+            <a:endCxn id="25" idx="0"/>
+          </p:cNvCxnSpPr>
+          <p:nvPr/>
+        </p:nvCxnSpPr>
+        <p:spPr>
+          <a:xfrm>
+            <a:off x="1623687" y="2178105"/>
+            <a:ext cx="0" cy="215444"/>
+          </a:xfrm>
+          <a:prstGeom prst="straightConnector1">
+            <a:avLst/>
+          </a:prstGeom>
+          <a:ln w="12700">
+            <a:solidFill>
+              <a:schemeClr val="tx1"/>
+            </a:solidFill>
+            <a:headEnd type="none" w="med" len="med"/>
+            <a:tailEnd type="triangle" w="med" len="med"/>
+          </a:ln>
+        </p:spPr>
+        <p:style>
+          <a:lnRef idx="1">
+            <a:schemeClr val="accent1"/>
+          </a:lnRef>
+          <a:fillRef idx="0">
+            <a:schemeClr val="accent1"/>
+          </a:fillRef>
+          <a:effectRef idx="0">
+            <a:schemeClr val="accent1"/>
+          </a:effectRef>
+          <a:fontRef idx="minor">
+            <a:schemeClr val="tx1"/>
+          </a:fontRef>
+        </p:style>
+      </p:cxnSp>
+      <p:sp>
+        <p:nvSpPr>
+          <p:cNvPr id="24" name="TextBox 23"/>
+          <p:cNvSpPr txBox="1"/>
+          <p:nvPr/>
+        </p:nvSpPr>
+        <p:spPr>
+          <a:xfrm>
+            <a:off x="1623687" y="2178105"/>
+            <a:ext cx="419100" cy="215444"/>
+          </a:xfrm>
+          <a:prstGeom prst="rect">
+            <a:avLst/>
+          </a:prstGeom>
+          <a:noFill/>
+        </p:spPr>
+        <p:txBody>
+          <a:bodyPr wrap="square" rtlCol="0">
+            <a:spAutoFit/>
+          </a:bodyPr>
+          <a:lstStyle/>
+          <a:p>
+            <a:r>
+              <a:rPr lang="en-US" sz="800" dirty="0" smtClean="0">
+                <a:latin typeface="Arial" pitchFamily="34" charset="0"/>
+                <a:cs typeface="Arial" pitchFamily="34" charset="0"/>
+              </a:rPr>
+              <a:t>ILP</a:t>
+            </a:r>
+            <a:endParaRPr lang="en-US" sz="800" dirty="0">
+              <a:latin typeface="Arial" pitchFamily="34" charset="0"/>
+              <a:cs typeface="Arial" pitchFamily="34" charset="0"/>
+            </a:endParaRPr>
+          </a:p>
+        </p:txBody>
+      </p:sp>
+      <p:sp>
+        <p:nvSpPr>
+          <p:cNvPr id="25" name="Rectangle 24"/>
+          <p:cNvSpPr/>
+          <p:nvPr/>
+        </p:nvSpPr>
+        <p:spPr>
+          <a:xfrm>
+            <a:off x="1217384" y="2393549"/>
+            <a:ext cx="812605" cy="250560"/>
+          </a:xfrm>
+          <a:prstGeom prst="rect">
+            <a:avLst/>
+          </a:prstGeom>
+          <a:solidFill>
+            <a:srgbClr val="FFFFCC"/>
+          </a:solidFill>
+          <a:ln w="12700">
+            <a:solidFill>
+              <a:schemeClr val="tx1"/>
+            </a:solidFill>
+          </a:ln>
+        </p:spPr>
+        <p:style>
+          <a:lnRef idx="2">
+            <a:schemeClr val="accent1">
+              <a:shade val="50000"/>
+            </a:schemeClr>
+          </a:lnRef>
+          <a:fillRef idx="1">
+            <a:schemeClr val="accent1"/>
+          </a:fillRef>
+          <a:effectRef idx="0">
+            <a:schemeClr val="accent1"/>
+          </a:effectRef>
+          <a:fontRef idx="minor">
+            <a:schemeClr val="lt1"/>
+          </a:fontRef>
+        </p:style>
+        <p:txBody>
+          <a:bodyPr rtlCol="0" anchor="ctr"/>
+          <a:lstStyle/>
+          <a:p>
+            <a:pPr algn="ctr"/>
+            <a:r>
+              <a:rPr lang="en-US" sz="800" dirty="0" err="1" smtClean="0">
+                <a:solidFill>
+                  <a:schemeClr val="tx1"/>
+                </a:solidFill>
+                <a:latin typeface="Arial" pitchFamily="34" charset="0"/>
+                <a:cs typeface="Arial" pitchFamily="34" charset="0"/>
+              </a:rPr>
+              <a:t>lp_solve</a:t>
+            </a:r>
+            <a:endParaRPr lang="en-US" sz="800" dirty="0">
+              <a:solidFill>
+                <a:schemeClr val="tx1"/>
+              </a:solidFill>
+              <a:latin typeface="Arial" pitchFamily="34" charset="0"/>
+              <a:cs typeface="Arial" pitchFamily="34" charset="0"/>
+            </a:endParaRPr>
+          </a:p>
+        </p:txBody>
+      </p:sp>
+      <p:cxnSp>
+        <p:nvCxnSpPr>
+          <p:cNvPr id="26" name="Straight Arrow Connector 25"/>
+          <p:cNvCxnSpPr>
+            <a:stCxn id="25" idx="2"/>
+          </p:cNvCxnSpPr>
+          <p:nvPr/>
+        </p:nvCxnSpPr>
+        <p:spPr>
+          <a:xfrm flipH="1">
+            <a:off x="1623686" y="2644109"/>
+            <a:ext cx="1" cy="215444"/>
+          </a:xfrm>
+          <a:prstGeom prst="straightConnector1">
+            <a:avLst/>
+          </a:prstGeom>
+          <a:ln w="12700">
+            <a:solidFill>
+              <a:schemeClr val="tx1"/>
+            </a:solidFill>
+            <a:headEnd type="none" w="med" len="med"/>
+            <a:tailEnd type="triangle" w="med" len="med"/>
+          </a:ln>
+        </p:spPr>
+        <p:style>
+          <a:lnRef idx="1">
+            <a:schemeClr val="accent1"/>
+          </a:lnRef>
+          <a:fillRef idx="0">
+            <a:schemeClr val="accent1"/>
+          </a:fillRef>
+          <a:effectRef idx="0">
+            <a:schemeClr val="accent1"/>
+          </a:effectRef>
+          <a:fontRef idx="minor">
+            <a:schemeClr val="tx1"/>
+          </a:fontRef>
+        </p:style>
+      </p:cxnSp>
+      <p:sp>
+        <p:nvSpPr>
+          <p:cNvPr id="27" name="TextBox 26"/>
+          <p:cNvSpPr txBox="1"/>
+          <p:nvPr/>
+        </p:nvSpPr>
+        <p:spPr>
+          <a:xfrm>
+            <a:off x="1623687" y="2644109"/>
+            <a:ext cx="543770" cy="215444"/>
+          </a:xfrm>
+          <a:prstGeom prst="rect">
+            <a:avLst/>
+          </a:prstGeom>
+          <a:noFill/>
+        </p:spPr>
+        <p:txBody>
+          <a:bodyPr wrap="square" rtlCol="0">
+            <a:spAutoFit/>
+          </a:bodyPr>
+          <a:lstStyle/>
+          <a:p>
+            <a:r>
+              <a:rPr lang="en-US" sz="800" dirty="0" smtClean="0">
+                <a:latin typeface="Arial" pitchFamily="34" charset="0"/>
+                <a:cs typeface="Arial" pitchFamily="34" charset="0"/>
+              </a:rPr>
+              <a:t>WCET</a:t>
+            </a:r>
+            <a:endParaRPr lang="en-US" sz="800" dirty="0">
+              <a:latin typeface="Arial" pitchFamily="34" charset="0"/>
+              <a:cs typeface="Arial" pitchFamily="34" charset="0"/>
+            </a:endParaRPr>
+          </a:p>
+        </p:txBody>
+      </p:sp>
+    </p:spTree>
+    <p:extLst>
+      <p:ext uri="{BB962C8B-B14F-4D97-AF65-F5344CB8AC3E}">
+        <p14:creationId xmlns:p14="http://schemas.microsoft.com/office/powerpoint/2010/main" val="2495756168"/>
       </p:ext>
     </p:extLst>
   </p:cSld>

</xml_diff>